<commit_message>
Add base 64 tab
</commit_message>
<xml_diff>
--- a/doc/Prezent.pptx
+++ b/doc/Prezent.pptx
@@ -124,7 +124,7 @@
   </p:defaultTextStyle>
   <p:extLst>
     <p:ext uri="{EFAFB233-063F-42B5-8137-9DF3F51BA10A}">
-      <p15:sldGuideLst xmlns:p15="http://schemas.microsoft.com/office/powerpoint/2012/main">
+      <p15:sldGuideLst xmlns="" xmlns:p15="http://schemas.microsoft.com/office/powerpoint/2012/main">
         <p15:guide id="1" orient="horz" pos="2160">
           <p15:clr>
             <a:srgbClr val="A4A3A4"/>
@@ -322,7 +322,7 @@
           <a:p>
             <a:fld id="{B4C71EC6-210F-42DE-9C53-41977AD35B3D}" type="datetimeFigureOut">
               <a:rPr lang="ru-RU" smtClean="0"/>
-              <a:t>05.06.2019</a:t>
+              <a:t>09.06.2020</a:t>
             </a:fld>
             <a:endParaRPr lang="ru-RU"/>
           </a:p>
@@ -487,7 +487,7 @@
           <a:p>
             <a:fld id="{B4C71EC6-210F-42DE-9C53-41977AD35B3D}" type="datetimeFigureOut">
               <a:rPr lang="ru-RU" smtClean="0"/>
-              <a:t>05.06.2019</a:t>
+              <a:t>09.06.2020</a:t>
             </a:fld>
             <a:endParaRPr lang="ru-RU"/>
           </a:p>
@@ -662,7 +662,7 @@
           <a:p>
             <a:fld id="{B4C71EC6-210F-42DE-9C53-41977AD35B3D}" type="datetimeFigureOut">
               <a:rPr lang="ru-RU" smtClean="0"/>
-              <a:t>05.06.2019</a:t>
+              <a:t>09.06.2020</a:t>
             </a:fld>
             <a:endParaRPr lang="ru-RU"/>
           </a:p>
@@ -827,7 +827,7 @@
           <a:p>
             <a:fld id="{B4C71EC6-210F-42DE-9C53-41977AD35B3D}" type="datetimeFigureOut">
               <a:rPr lang="ru-RU" smtClean="0"/>
-              <a:t>05.06.2019</a:t>
+              <a:t>09.06.2020</a:t>
             </a:fld>
             <a:endParaRPr lang="ru-RU"/>
           </a:p>
@@ -1068,7 +1068,7 @@
           <a:p>
             <a:fld id="{B4C71EC6-210F-42DE-9C53-41977AD35B3D}" type="datetimeFigureOut">
               <a:rPr lang="ru-RU" smtClean="0"/>
-              <a:t>05.06.2019</a:t>
+              <a:t>09.06.2020</a:t>
             </a:fld>
             <a:endParaRPr lang="ru-RU"/>
           </a:p>
@@ -1351,7 +1351,7 @@
           <a:p>
             <a:fld id="{B4C71EC6-210F-42DE-9C53-41977AD35B3D}" type="datetimeFigureOut">
               <a:rPr lang="ru-RU" smtClean="0"/>
-              <a:t>05.06.2019</a:t>
+              <a:t>09.06.2020</a:t>
             </a:fld>
             <a:endParaRPr lang="ru-RU"/>
           </a:p>
@@ -1768,7 +1768,7 @@
           <a:p>
             <a:fld id="{B4C71EC6-210F-42DE-9C53-41977AD35B3D}" type="datetimeFigureOut">
               <a:rPr lang="ru-RU" smtClean="0"/>
-              <a:t>05.06.2019</a:t>
+              <a:t>09.06.2020</a:t>
             </a:fld>
             <a:endParaRPr lang="ru-RU"/>
           </a:p>
@@ -1881,7 +1881,7 @@
           <a:p>
             <a:fld id="{B4C71EC6-210F-42DE-9C53-41977AD35B3D}" type="datetimeFigureOut">
               <a:rPr lang="ru-RU" smtClean="0"/>
-              <a:t>05.06.2019</a:t>
+              <a:t>09.06.2020</a:t>
             </a:fld>
             <a:endParaRPr lang="ru-RU"/>
           </a:p>
@@ -1971,7 +1971,7 @@
           <a:p>
             <a:fld id="{B4C71EC6-210F-42DE-9C53-41977AD35B3D}" type="datetimeFigureOut">
               <a:rPr lang="ru-RU" smtClean="0"/>
-              <a:t>05.06.2019</a:t>
+              <a:t>09.06.2020</a:t>
             </a:fld>
             <a:endParaRPr lang="ru-RU"/>
           </a:p>
@@ -2243,7 +2243,7 @@
           <a:p>
             <a:fld id="{B4C71EC6-210F-42DE-9C53-41977AD35B3D}" type="datetimeFigureOut">
               <a:rPr lang="ru-RU" smtClean="0"/>
-              <a:t>05.06.2019</a:t>
+              <a:t>09.06.2020</a:t>
             </a:fld>
             <a:endParaRPr lang="ru-RU"/>
           </a:p>
@@ -2491,7 +2491,7 @@
           <a:p>
             <a:fld id="{B4C71EC6-210F-42DE-9C53-41977AD35B3D}" type="datetimeFigureOut">
               <a:rPr lang="ru-RU" smtClean="0"/>
-              <a:t>05.06.2019</a:t>
+              <a:t>09.06.2020</a:t>
             </a:fld>
             <a:endParaRPr lang="ru-RU"/>
           </a:p>
@@ -2723,7 +2723,7 @@
           <a:p>
             <a:fld id="{B4C71EC6-210F-42DE-9C53-41977AD35B3D}" type="datetimeFigureOut">
               <a:rPr lang="ru-RU" smtClean="0"/>
-              <a:t>05.06.2019</a:t>
+              <a:t>09.06.2020</a:t>
             </a:fld>
             <a:endParaRPr lang="ru-RU"/>
           </a:p>
@@ -3241,11 +3241,7 @@
             <a:pPr algn="ctr"/>
             <a:r>
               <a:rPr lang="ru-RU" dirty="0" smtClean="0"/>
-              <a:t>Витебск, </a:t>
-            </a:r>
-            <a:r>
-              <a:rPr lang="ru-RU" dirty="0" smtClean="0"/>
-              <a:t>2019</a:t>
+              <a:t>Витебск, 2019</a:t>
             </a:r>
             <a:endParaRPr lang="ru-RU" dirty="0"/>
           </a:p>
@@ -4063,35 +4059,31 @@
       </p:sp>
       <p:pic>
         <p:nvPicPr>
-          <p:cNvPr id="4" name="Рисунок 3"/>
+          <p:cNvPr id="5" name="Рисунок 4"/>
           <p:cNvPicPr/>
           <p:nvPr/>
         </p:nvPicPr>
-        <p:blipFill>
-          <a:blip r:embed="rId2">
-            <a:extLst>
-              <a:ext uri="{28A0092B-C50C-407E-A947-70E740481C1C}">
-                <a14:useLocalDpi xmlns:a14="http://schemas.microsoft.com/office/drawing/2010/main" val="0"/>
-              </a:ext>
-            </a:extLst>
-          </a:blip>
-          <a:srcRect/>
-          <a:stretch>
-            <a:fillRect/>
-          </a:stretch>
+        <p:blipFill rotWithShape="1">
+          <a:blip r:embed="rId2"/>
+          <a:srcRect l="36395" t="32782" r="36348" b="36639"/>
+          <a:stretch/>
         </p:blipFill>
         <p:spPr bwMode="auto">
           <a:xfrm>
-            <a:off x="1367644" y="2276872"/>
-            <a:ext cx="6408711" cy="3754909"/>
+            <a:off x="1979712" y="2132856"/>
+            <a:ext cx="5256584" cy="3248563"/>
           </a:xfrm>
           <a:prstGeom prst="rect">
             <a:avLst/>
           </a:prstGeom>
-          <a:noFill/>
           <a:ln>
             <a:noFill/>
           </a:ln>
+          <a:extLst>
+            <a:ext uri="{53640926-AAD7-44D8-BBD7-CCE9431645EC}">
+              <a14:shadowObscured xmlns:a14="http://schemas.microsoft.com/office/drawing/2010/main"/>
+            </a:ext>
+          </a:extLst>
         </p:spPr>
       </p:pic>
     </p:spTree>
@@ -4177,13 +4169,8 @@
             <a:pPr lvl="0"/>
             <a:r>
               <a:rPr lang="ru-RU" dirty="0" smtClean="0"/>
-              <a:t>Был создан программный продукт, который можно использовать для обучени</a:t>
-            </a:r>
-            <a:r>
-              <a:rPr lang="ru-RU" dirty="0" smtClean="0"/>
-              <a:t>я учащихся в качестве наглядного материала;</a:t>
-            </a:r>
-            <a:endParaRPr lang="ru-RU" dirty="0" smtClean="0"/>
+              <a:t>Был создан программный продукт, который можно использовать для обучения учащихся в качестве наглядного материала;</a:t>
+            </a:r>
           </a:p>
           <a:p>
             <a:pPr lvl="0"/>
@@ -4195,7 +4182,6 @@
               <a:rPr lang="ru-RU" dirty="0" smtClean="0"/>
               <a:t>Разные алгоритмы кодирования и декодирования используются в разных предметных областях для разных целей</a:t>
             </a:r>
-            <a:endParaRPr lang="ru-RU" dirty="0" smtClean="0"/>
           </a:p>
           <a:p>
             <a:endParaRPr lang="ru-RU" dirty="0"/>
@@ -4474,11 +4460,11 @@
             </a:r>
             <a:r>
               <a:rPr lang="ru-RU" sz="2800" dirty="0" smtClean="0"/>
-              <a:t>Понять </a:t>
+              <a:t>Изучить в </a:t>
             </a:r>
             <a:r>
               <a:rPr lang="ru-RU" sz="2800" dirty="0"/>
-              <a:t>в каких случаях какие способы и алгоритмы кодирования и декодирования информации используются.</a:t>
+              <a:t>каких случаях какие способы и алгоритмы кодирования и декодирования информации используются.</a:t>
             </a:r>
           </a:p>
           <a:p>

</xml_diff>